<commit_message>
Update solution design docs
</commit_message>
<xml_diff>
--- a/design/Design.pptx
+++ b/design/Design.pptx
@@ -104,6 +104,11 @@
       </a:defRPr>
     </a:lvl9pPr>
   </p:defaultTextStyle>
+  <p:extLst>
+    <p:ext uri="{EFAFB233-063F-42B5-8137-9DF3F51BA10A}">
+      <p15:sldGuideLst xmlns:p15="http://schemas.microsoft.com/office/powerpoint/2012/main"/>
+    </p:ext>
+  </p:extLst>
 </p:presentation>
 </file>
 
@@ -254,7 +259,7 @@
           <a:p>
             <a:fld id="{F4D45F52-4B85-444B-B170-249982F8F5EA}" type="datetimeFigureOut">
               <a:rPr lang="en-US" smtClean="0"/>
-              <a:t>6/15/19</a:t>
+              <a:t>6/20/19</a:t>
             </a:fld>
             <a:endParaRPr lang="en-US"/>
           </a:p>
@@ -452,7 +457,7 @@
           <a:p>
             <a:fld id="{F4D45F52-4B85-444B-B170-249982F8F5EA}" type="datetimeFigureOut">
               <a:rPr lang="en-US" smtClean="0"/>
-              <a:t>6/15/19</a:t>
+              <a:t>6/20/19</a:t>
             </a:fld>
             <a:endParaRPr lang="en-US"/>
           </a:p>
@@ -660,7 +665,7 @@
           <a:p>
             <a:fld id="{F4D45F52-4B85-444B-B170-249982F8F5EA}" type="datetimeFigureOut">
               <a:rPr lang="en-US" smtClean="0"/>
-              <a:t>6/15/19</a:t>
+              <a:t>6/20/19</a:t>
             </a:fld>
             <a:endParaRPr lang="en-US"/>
           </a:p>
@@ -858,7 +863,7 @@
           <a:p>
             <a:fld id="{F4D45F52-4B85-444B-B170-249982F8F5EA}" type="datetimeFigureOut">
               <a:rPr lang="en-US" smtClean="0"/>
-              <a:t>6/15/19</a:t>
+              <a:t>6/20/19</a:t>
             </a:fld>
             <a:endParaRPr lang="en-US"/>
           </a:p>
@@ -1133,7 +1138,7 @@
           <a:p>
             <a:fld id="{F4D45F52-4B85-444B-B170-249982F8F5EA}" type="datetimeFigureOut">
               <a:rPr lang="en-US" smtClean="0"/>
-              <a:t>6/15/19</a:t>
+              <a:t>6/20/19</a:t>
             </a:fld>
             <a:endParaRPr lang="en-US"/>
           </a:p>
@@ -1398,7 +1403,7 @@
           <a:p>
             <a:fld id="{F4D45F52-4B85-444B-B170-249982F8F5EA}" type="datetimeFigureOut">
               <a:rPr lang="en-US" smtClean="0"/>
-              <a:t>6/15/19</a:t>
+              <a:t>6/20/19</a:t>
             </a:fld>
             <a:endParaRPr lang="en-US"/>
           </a:p>
@@ -1810,7 +1815,7 @@
           <a:p>
             <a:fld id="{F4D45F52-4B85-444B-B170-249982F8F5EA}" type="datetimeFigureOut">
               <a:rPr lang="en-US" smtClean="0"/>
-              <a:t>6/15/19</a:t>
+              <a:t>6/20/19</a:t>
             </a:fld>
             <a:endParaRPr lang="en-US"/>
           </a:p>
@@ -1951,7 +1956,7 @@
           <a:p>
             <a:fld id="{F4D45F52-4B85-444B-B170-249982F8F5EA}" type="datetimeFigureOut">
               <a:rPr lang="en-US" smtClean="0"/>
-              <a:t>6/15/19</a:t>
+              <a:t>6/20/19</a:t>
             </a:fld>
             <a:endParaRPr lang="en-US"/>
           </a:p>
@@ -2064,7 +2069,7 @@
           <a:p>
             <a:fld id="{F4D45F52-4B85-444B-B170-249982F8F5EA}" type="datetimeFigureOut">
               <a:rPr lang="en-US" smtClean="0"/>
-              <a:t>6/15/19</a:t>
+              <a:t>6/20/19</a:t>
             </a:fld>
             <a:endParaRPr lang="en-US"/>
           </a:p>
@@ -2375,7 +2380,7 @@
           <a:p>
             <a:fld id="{F4D45F52-4B85-444B-B170-249982F8F5EA}" type="datetimeFigureOut">
               <a:rPr lang="en-US" smtClean="0"/>
-              <a:t>6/15/19</a:t>
+              <a:t>6/20/19</a:t>
             </a:fld>
             <a:endParaRPr lang="en-US"/>
           </a:p>
@@ -2663,7 +2668,7 @@
           <a:p>
             <a:fld id="{F4D45F52-4B85-444B-B170-249982F8F5EA}" type="datetimeFigureOut">
               <a:rPr lang="en-US" smtClean="0"/>
-              <a:t>6/15/19</a:t>
+              <a:t>6/20/19</a:t>
             </a:fld>
             <a:endParaRPr lang="en-US"/>
           </a:p>
@@ -2904,7 +2909,7 @@
           <a:p>
             <a:fld id="{F4D45F52-4B85-444B-B170-249982F8F5EA}" type="datetimeFigureOut">
               <a:rPr lang="en-US" smtClean="0"/>
-              <a:t>6/15/19</a:t>
+              <a:t>6/20/19</a:t>
             </a:fld>
             <a:endParaRPr lang="en-US"/>
           </a:p>
@@ -3335,7 +3340,7 @@
         </p:nvSpPr>
         <p:spPr>
           <a:xfrm>
-            <a:off x="3515710" y="722582"/>
+            <a:off x="3400095" y="375970"/>
             <a:ext cx="1040524" cy="1008993"/>
           </a:xfrm>
           <a:prstGeom prst="can">
@@ -3384,7 +3389,7 @@
         </p:nvSpPr>
         <p:spPr>
           <a:xfrm>
-            <a:off x="6332481" y="3605045"/>
+            <a:off x="6279929" y="2501459"/>
             <a:ext cx="2753710" cy="819807"/>
           </a:xfrm>
           <a:prstGeom prst="leftRightArrow">
@@ -3433,7 +3438,7 @@
         </p:nvSpPr>
         <p:spPr>
           <a:xfrm>
-            <a:off x="6589985" y="504497"/>
+            <a:off x="6611004" y="5047655"/>
             <a:ext cx="2238703" cy="1040524"/>
           </a:xfrm>
           <a:prstGeom prst="cloud">
@@ -3482,7 +3487,7 @@
         </p:nvSpPr>
         <p:spPr>
           <a:xfrm>
-            <a:off x="6695089" y="2012730"/>
+            <a:off x="2906109" y="4993153"/>
             <a:ext cx="2028497" cy="1124606"/>
           </a:xfrm>
           <a:prstGeom prst="rect">
@@ -3538,7 +3543,7 @@
         </p:nvSpPr>
         <p:spPr>
           <a:xfrm>
-            <a:off x="2916620" y="4653454"/>
+            <a:off x="482490" y="3056136"/>
             <a:ext cx="546538" cy="557052"/>
           </a:xfrm>
           <a:prstGeom prst="smileyFace">
@@ -3584,7 +3589,7 @@
         </p:nvSpPr>
         <p:spPr>
           <a:xfrm>
-            <a:off x="3126827" y="3933497"/>
+            <a:off x="990270" y="2575031"/>
             <a:ext cx="388883" cy="672662"/>
           </a:xfrm>
           <a:prstGeom prst="roundRect">
@@ -3630,7 +3635,7 @@
         </p:nvSpPr>
         <p:spPr>
           <a:xfrm>
-            <a:off x="6695089" y="4897811"/>
+            <a:off x="9814033" y="2349060"/>
             <a:ext cx="2028497" cy="1124606"/>
           </a:xfrm>
           <a:prstGeom prst="rect">
@@ -3679,7 +3684,7 @@
         </p:nvSpPr>
         <p:spPr>
           <a:xfrm>
-            <a:off x="2906109" y="2270233"/>
+            <a:off x="2906109" y="2349060"/>
             <a:ext cx="2028497" cy="1124606"/>
           </a:xfrm>
           <a:prstGeom prst="rect">
@@ -3730,9 +3735,9 @@
           <p:nvPr/>
         </p:nvCxnSpPr>
         <p:spPr>
-          <a:xfrm flipV="1">
-            <a:off x="3920358" y="1731575"/>
-            <a:ext cx="115614" cy="538658"/>
+          <a:xfrm flipH="1" flipV="1">
+            <a:off x="3920357" y="1384963"/>
+            <a:ext cx="1" cy="964097"/>
           </a:xfrm>
           <a:prstGeom prst="straightConnector1">
             <a:avLst/>
@@ -3767,15 +3772,16 @@
             </a:extLst>
           </p:cNvPr>
           <p:cNvCxnSpPr>
-            <a:stCxn id="15" idx="3"/>
-            <a:endCxn id="7" idx="1"/>
+            <a:cxnSpLocks/>
+            <a:stCxn id="15" idx="2"/>
+            <a:endCxn id="7" idx="0"/>
           </p:cNvCxnSpPr>
           <p:nvPr/>
         </p:nvCxnSpPr>
         <p:spPr>
-          <a:xfrm flipV="1">
-            <a:off x="4934606" y="2575033"/>
-            <a:ext cx="1760483" cy="257503"/>
+          <a:xfrm>
+            <a:off x="3920358" y="3473666"/>
+            <a:ext cx="0" cy="1519487"/>
           </a:xfrm>
           <a:prstGeom prst="straightConnector1">
             <a:avLst/>
@@ -3809,15 +3815,16 @@
             </a:extLst>
           </p:cNvPr>
           <p:cNvCxnSpPr>
-            <a:stCxn id="6" idx="1"/>
-            <a:endCxn id="7" idx="0"/>
+            <a:cxnSpLocks/>
+            <a:stCxn id="6" idx="2"/>
+            <a:endCxn id="7" idx="3"/>
           </p:cNvCxnSpPr>
           <p:nvPr/>
         </p:nvCxnSpPr>
         <p:spPr>
-          <a:xfrm>
-            <a:off x="7709337" y="1543913"/>
-            <a:ext cx="1" cy="468817"/>
+          <a:xfrm flipH="1" flipV="1">
+            <a:off x="4934606" y="5555456"/>
+            <a:ext cx="1683342" cy="12461"/>
           </a:xfrm>
           <a:prstGeom prst="straightConnector1">
             <a:avLst/>
@@ -3852,15 +3859,16 @@
             </a:extLst>
           </p:cNvPr>
           <p:cNvCxnSpPr>
-            <a:stCxn id="7" idx="2"/>
-            <a:endCxn id="5" idx="1"/>
+            <a:cxnSpLocks/>
+            <a:stCxn id="7" idx="3"/>
+            <a:endCxn id="5" idx="5"/>
           </p:cNvCxnSpPr>
           <p:nvPr/>
         </p:nvCxnSpPr>
         <p:spPr>
-          <a:xfrm flipH="1">
-            <a:off x="7709336" y="3137336"/>
-            <a:ext cx="2" cy="672661"/>
+          <a:xfrm flipV="1">
+            <a:off x="4934606" y="3116314"/>
+            <a:ext cx="2722178" cy="2439142"/>
           </a:xfrm>
           <a:prstGeom prst="straightConnector1">
             <a:avLst/>
@@ -3894,15 +3902,16 @@
             </a:extLst>
           </p:cNvPr>
           <p:cNvCxnSpPr>
-            <a:stCxn id="5" idx="5"/>
-            <a:endCxn id="11" idx="0"/>
+            <a:cxnSpLocks/>
+            <a:stCxn id="5" idx="7"/>
+            <a:endCxn id="11" idx="1"/>
           </p:cNvCxnSpPr>
           <p:nvPr/>
         </p:nvCxnSpPr>
         <p:spPr>
           <a:xfrm>
-            <a:off x="7709336" y="4219900"/>
-            <a:ext cx="2" cy="677911"/>
+            <a:off x="9033639" y="2911363"/>
+            <a:ext cx="780394" cy="0"/>
           </a:xfrm>
           <a:prstGeom prst="straightConnector1">
             <a:avLst/>
@@ -3943,9 +3952,9 @@
           <p:nvPr/>
         </p:nvCxnSpPr>
         <p:spPr>
-          <a:xfrm flipH="1" flipV="1">
-            <a:off x="4934606" y="2832536"/>
-            <a:ext cx="1397875" cy="1182413"/>
+          <a:xfrm flipH="1">
+            <a:off x="4934606" y="2911363"/>
+            <a:ext cx="1345323" cy="0"/>
           </a:xfrm>
           <a:prstGeom prst="straightConnector1">
             <a:avLst/>
@@ -3980,15 +3989,16 @@
             </a:extLst>
           </p:cNvPr>
           <p:cNvCxnSpPr>
-            <a:stCxn id="15" idx="2"/>
-            <a:endCxn id="9" idx="0"/>
+            <a:cxnSpLocks/>
+            <a:stCxn id="15" idx="1"/>
+            <a:endCxn id="9" idx="3"/>
           </p:cNvCxnSpPr>
           <p:nvPr/>
         </p:nvCxnSpPr>
         <p:spPr>
-          <a:xfrm flipH="1">
-            <a:off x="3321269" y="3394839"/>
-            <a:ext cx="599089" cy="538658"/>
+          <a:xfrm flipH="1" flipV="1">
+            <a:off x="1379153" y="2911362"/>
+            <a:ext cx="1526956" cy="1"/>
           </a:xfrm>
           <a:prstGeom prst="straightConnector1">
             <a:avLst/>
@@ -4027,7 +4037,7 @@
         </p:nvSpPr>
         <p:spPr>
           <a:xfrm>
-            <a:off x="3515710" y="3528848"/>
+            <a:off x="2119146" y="2614706"/>
             <a:ext cx="409903" cy="369332"/>
           </a:xfrm>
           <a:prstGeom prst="rect">
@@ -4097,7 +4107,7 @@
         </p:nvSpPr>
         <p:spPr>
           <a:xfrm>
-            <a:off x="5814847" y="2360141"/>
+            <a:off x="3837588" y="4299519"/>
             <a:ext cx="281153" cy="369332"/>
           </a:xfrm>
           <a:prstGeom prst="rect">
@@ -4132,7 +4142,7 @@
         </p:nvSpPr>
         <p:spPr>
           <a:xfrm>
-            <a:off x="7317431" y="1643398"/>
+            <a:off x="5873965" y="5198585"/>
             <a:ext cx="281153" cy="369332"/>
           </a:xfrm>
           <a:prstGeom prst="rect">
@@ -4167,8 +4177,8 @@
         </p:nvSpPr>
         <p:spPr>
           <a:xfrm>
-            <a:off x="7449203" y="3294836"/>
-            <a:ext cx="281153" cy="369332"/>
+            <a:off x="6316057" y="3773087"/>
+            <a:ext cx="354725" cy="369332"/>
           </a:xfrm>
           <a:prstGeom prst="rect">
             <a:avLst/>
@@ -4202,7 +4212,7 @@
         </p:nvSpPr>
         <p:spPr>
           <a:xfrm>
-            <a:off x="7375631" y="4421493"/>
+            <a:off x="9283259" y="2965330"/>
             <a:ext cx="281153" cy="369332"/>
           </a:xfrm>
           <a:prstGeom prst="rect">
@@ -4237,7 +4247,7 @@
         </p:nvSpPr>
         <p:spPr>
           <a:xfrm>
-            <a:off x="5403628" y="3334664"/>
+            <a:off x="5635700" y="3001619"/>
             <a:ext cx="281153" cy="369332"/>
           </a:xfrm>
           <a:prstGeom prst="rect">
@@ -4254,6 +4264,216 @@
             <a:r>
               <a:rPr lang="en-US" dirty="0"/>
               <a:t>7</a:t>
+            </a:r>
+          </a:p>
+        </p:txBody>
+      </p:sp>
+      <p:sp>
+        <p:nvSpPr>
+          <p:cNvPr id="56" name="Rectangle 55">
+            <a:extLst>
+              <a:ext uri="{FF2B5EF4-FFF2-40B4-BE49-F238E27FC236}">
+                <a16:creationId xmlns:a16="http://schemas.microsoft.com/office/drawing/2014/main" id="{C0DA622E-EE3F-C24D-BD5A-3F57B7187DB7}"/>
+              </a:ext>
+            </a:extLst>
+          </p:cNvPr>
+          <p:cNvSpPr/>
+          <p:nvPr/>
+        </p:nvSpPr>
+        <p:spPr>
+          <a:xfrm>
+            <a:off x="6642535" y="177938"/>
+            <a:ext cx="2028497" cy="1124606"/>
+          </a:xfrm>
+          <a:prstGeom prst="rect">
+            <a:avLst/>
+          </a:prstGeom>
+        </p:spPr>
+        <p:style>
+          <a:lnRef idx="2">
+            <a:schemeClr val="accent1">
+              <a:shade val="50000"/>
+            </a:schemeClr>
+          </a:lnRef>
+          <a:fillRef idx="1">
+            <a:schemeClr val="accent1"/>
+          </a:fillRef>
+          <a:effectRef idx="0">
+            <a:schemeClr val="accent1"/>
+          </a:effectRef>
+          <a:fontRef idx="minor">
+            <a:schemeClr val="lt1"/>
+          </a:fontRef>
+        </p:style>
+        <p:txBody>
+          <a:bodyPr rtlCol="0" anchor="ctr"/>
+          <a:lstStyle/>
+          <a:p>
+            <a:pPr algn="ctr"/>
+            <a:r>
+              <a:rPr lang="en-US" dirty="0"/>
+              <a:t>IBM Cloud Functions</a:t>
+            </a:r>
+          </a:p>
+        </p:txBody>
+      </p:sp>
+      <p:cxnSp>
+        <p:nvCxnSpPr>
+          <p:cNvPr id="42" name="Straight Arrow Connector 41">
+            <a:extLst>
+              <a:ext uri="{FF2B5EF4-FFF2-40B4-BE49-F238E27FC236}">
+                <a16:creationId xmlns:a16="http://schemas.microsoft.com/office/drawing/2014/main" id="{6E697737-15C3-2045-81DA-94EF4DE901DB}"/>
+              </a:ext>
+            </a:extLst>
+          </p:cNvPr>
+          <p:cNvCxnSpPr/>
+          <p:nvPr/>
+        </p:nvCxnSpPr>
+        <p:spPr>
+          <a:xfrm flipV="1">
+            <a:off x="4934606" y="1302544"/>
+            <a:ext cx="1707929" cy="1046516"/>
+          </a:xfrm>
+          <a:prstGeom prst="straightConnector1">
+            <a:avLst/>
+          </a:prstGeom>
+          <a:ln>
+            <a:headEnd type="triangle"/>
+            <a:tailEnd type="triangle"/>
+          </a:ln>
+        </p:spPr>
+        <p:style>
+          <a:lnRef idx="1">
+            <a:schemeClr val="accent1"/>
+          </a:lnRef>
+          <a:fillRef idx="0">
+            <a:schemeClr val="accent1"/>
+          </a:fillRef>
+          <a:effectRef idx="0">
+            <a:schemeClr val="accent1"/>
+          </a:effectRef>
+          <a:fontRef idx="minor">
+            <a:schemeClr val="tx1"/>
+          </a:fontRef>
+        </p:style>
+      </p:cxnSp>
+      <p:sp>
+        <p:nvSpPr>
+          <p:cNvPr id="44" name="TextBox 43">
+            <a:extLst>
+              <a:ext uri="{FF2B5EF4-FFF2-40B4-BE49-F238E27FC236}">
+                <a16:creationId xmlns:a16="http://schemas.microsoft.com/office/drawing/2014/main" id="{6940E521-915F-6845-8736-5625DAD66D1A}"/>
+              </a:ext>
+            </a:extLst>
+          </p:cNvPr>
+          <p:cNvSpPr txBox="1"/>
+          <p:nvPr/>
+        </p:nvSpPr>
+        <p:spPr>
+          <a:xfrm>
+            <a:off x="5635700" y="1384963"/>
+            <a:ext cx="281153" cy="369332"/>
+          </a:xfrm>
+          <a:prstGeom prst="rect">
+            <a:avLst/>
+          </a:prstGeom>
+          <a:noFill/>
+        </p:spPr>
+        <p:txBody>
+          <a:bodyPr wrap="square" rtlCol="0">
+            <a:spAutoFit/>
+          </a:bodyPr>
+          <a:lstStyle/>
+          <a:p>
+            <a:r>
+              <a:rPr lang="en-US" dirty="0"/>
+              <a:t>8</a:t>
+            </a:r>
+          </a:p>
+        </p:txBody>
+      </p:sp>
+      <p:sp>
+        <p:nvSpPr>
+          <p:cNvPr id="46" name="Rounded Rectangle 45">
+            <a:extLst>
+              <a:ext uri="{FF2B5EF4-FFF2-40B4-BE49-F238E27FC236}">
+                <a16:creationId xmlns:a16="http://schemas.microsoft.com/office/drawing/2014/main" id="{932AC074-9BB6-0346-A0A6-B54B1580D94F}"/>
+              </a:ext>
+            </a:extLst>
+          </p:cNvPr>
+          <p:cNvSpPr/>
+          <p:nvPr/>
+        </p:nvSpPr>
+        <p:spPr>
+          <a:xfrm>
+            <a:off x="2119146" y="31532"/>
+            <a:ext cx="9883668" cy="6784427"/>
+          </a:xfrm>
+          <a:prstGeom prst="roundRect">
+            <a:avLst/>
+          </a:prstGeom>
+          <a:noFill/>
+        </p:spPr>
+        <p:style>
+          <a:lnRef idx="2">
+            <a:schemeClr val="accent1">
+              <a:shade val="50000"/>
+            </a:schemeClr>
+          </a:lnRef>
+          <a:fillRef idx="1">
+            <a:schemeClr val="accent1"/>
+          </a:fillRef>
+          <a:effectRef idx="0">
+            <a:schemeClr val="accent1"/>
+          </a:effectRef>
+          <a:fontRef idx="minor">
+            <a:schemeClr val="lt1"/>
+          </a:fontRef>
+        </p:style>
+        <p:txBody>
+          <a:bodyPr rtlCol="0" anchor="ctr"/>
+          <a:lstStyle/>
+          <a:p>
+            <a:pPr algn="ctr"/>
+            <a:endParaRPr lang="en-US" dirty="0"/>
+          </a:p>
+        </p:txBody>
+      </p:sp>
+      <p:sp>
+        <p:nvSpPr>
+          <p:cNvPr id="60" name="TextBox 59">
+            <a:extLst>
+              <a:ext uri="{FF2B5EF4-FFF2-40B4-BE49-F238E27FC236}">
+                <a16:creationId xmlns:a16="http://schemas.microsoft.com/office/drawing/2014/main" id="{1F256308-DBB1-4440-8702-FD8F520BF3B6}"/>
+              </a:ext>
+            </a:extLst>
+          </p:cNvPr>
+          <p:cNvSpPr txBox="1"/>
+          <p:nvPr/>
+        </p:nvSpPr>
+        <p:spPr>
+          <a:xfrm>
+            <a:off x="10088613" y="177938"/>
+            <a:ext cx="1568670" cy="369332"/>
+          </a:xfrm>
+          <a:prstGeom prst="rect">
+            <a:avLst/>
+          </a:prstGeom>
+          <a:noFill/>
+        </p:spPr>
+        <p:txBody>
+          <a:bodyPr wrap="square" rtlCol="0">
+            <a:spAutoFit/>
+          </a:bodyPr>
+          <a:lstStyle/>
+          <a:p>
+            <a:r>
+              <a:rPr lang="en-US" dirty="0">
+                <a:solidFill>
+                  <a:schemeClr val="accent1"/>
+                </a:solidFill>
+              </a:rPr>
+              <a:t>IBM Cloud</a:t>
             </a:r>
           </a:p>
         </p:txBody>

</xml_diff>